<commit_message>
Juan Pablo and Said Mejia Merge presentation
</commit_message>
<xml_diff>
--- a/reports/meeting_ppt/5_6/5_6_21.pptx
+++ b/reports/meeting_ppt/5_6/5_6_21.pptx
@@ -5,9 +5,11 @@
     <p:sldMasterId id="2147483648" r:id="rId1"/>
   </p:sldMasterIdLst>
   <p:sldIdLst>
-    <p:sldId id="261" r:id="rId2"/>
-    <p:sldId id="258" r:id="rId3"/>
-    <p:sldId id="260" r:id="rId4"/>
+    <p:sldId id="263" r:id="rId2"/>
+    <p:sldId id="260" r:id="rId3"/>
+    <p:sldId id="261" r:id="rId4"/>
+    <p:sldId id="258" r:id="rId5"/>
+    <p:sldId id="262" r:id="rId6"/>
   </p:sldIdLst>
   <p:sldSz cx="12192000" cy="6858000"/>
   <p:notesSz cx="6858000" cy="9144000"/>
@@ -106,6 +108,11 @@
       </a:defRPr>
     </a:lvl9pPr>
   </p:defaultTextStyle>
+  <p:extLst>
+    <p:ext uri="{EFAFB233-063F-42B5-8137-9DF3F51BA10A}">
+      <p15:sldGuideLst xmlns:p15="http://schemas.microsoft.com/office/powerpoint/2012/main"/>
+    </p:ext>
+  </p:extLst>
 </p:presentation>
 </file>
 
@@ -3328,7 +3335,7 @@
           <p:cNvPr id="2" name="Title 1">
             <a:extLst>
               <a:ext uri="{FF2B5EF4-FFF2-40B4-BE49-F238E27FC236}">
-                <a16:creationId xmlns:a16="http://schemas.microsoft.com/office/drawing/2014/main" id="{8D24E6E1-A6C0-4B0E-996A-97613C04D641}"/>
+                <a16:creationId xmlns:a16="http://schemas.microsoft.com/office/drawing/2014/main" id="{FA214708-2A2E-468B-B384-F184AA449ED9}"/>
               </a:ext>
             </a:extLst>
           </p:cNvPr>
@@ -3345,168 +3352,384 @@
           <a:lstStyle/>
           <a:p>
             <a:r>
+              <a:rPr lang="en-US" dirty="0" err="1"/>
+              <a:t>DeepGlobe</a:t>
+            </a:r>
+            <a:r>
               <a:rPr lang="en-US" dirty="0"/>
-              <a:t>Models</a:t>
-            </a:r>
-          </a:p>
-        </p:txBody>
-      </p:sp>
-      <p:sp>
-        <p:nvSpPr>
-          <p:cNvPr id="3" name="Content Placeholder 2">
-            <a:extLst>
-              <a:ext uri="{FF2B5EF4-FFF2-40B4-BE49-F238E27FC236}">
-                <a16:creationId xmlns:a16="http://schemas.microsoft.com/office/drawing/2014/main" id="{E291BEC6-7826-4CF8-A2AE-7CA47A821A2A}"/>
-              </a:ext>
-            </a:extLst>
-          </p:cNvPr>
-          <p:cNvSpPr>
-            <a:spLocks noGrp="1"/>
-          </p:cNvSpPr>
+              <a:t> Dataset</a:t>
+            </a:r>
+          </a:p>
+        </p:txBody>
+      </p:sp>
+      <p:graphicFrame>
+        <p:nvGraphicFramePr>
+          <p:cNvPr id="4" name="Content Placeholder 3">
+            <a:extLst>
+              <a:ext uri="{FF2B5EF4-FFF2-40B4-BE49-F238E27FC236}">
+                <a16:creationId xmlns:a16="http://schemas.microsoft.com/office/drawing/2014/main" id="{7500FD43-D6B1-4D18-8936-7E589605FDE9}"/>
+              </a:ext>
+            </a:extLst>
+          </p:cNvPr>
+          <p:cNvGraphicFramePr>
+            <a:graphicFrameLocks noGrp="1"/>
+          </p:cNvGraphicFramePr>
           <p:nvPr>
             <p:ph idx="1"/>
-          </p:nvPr>
-        </p:nvSpPr>
-        <p:spPr/>
-        <p:txBody>
-          <a:bodyPr/>
-          <a:lstStyle/>
-          <a:p>
-            <a:r>
-              <a:rPr lang="en-US" dirty="0"/>
-              <a:t>UNET</a:t>
-            </a:r>
-          </a:p>
-          <a:p>
-            <a:r>
-              <a:rPr lang="en-US" dirty="0"/>
-              <a:t>VGG16_UNET</a:t>
-            </a:r>
-          </a:p>
-          <a:p>
-            <a:r>
-              <a:rPr lang="en-US" dirty="0"/>
-              <a:t>RESNET50_UNET</a:t>
-            </a:r>
-          </a:p>
-          <a:p>
-            <a:r>
-              <a:rPr lang="en-US" dirty="0"/>
-              <a:t>SEGNET</a:t>
-            </a:r>
-          </a:p>
-          <a:p>
-            <a:r>
-              <a:rPr lang="en-US" dirty="0"/>
-              <a:t>VGG16_SEGNET</a:t>
-            </a:r>
-          </a:p>
-          <a:p>
-            <a:r>
-              <a:rPr lang="en-US" dirty="0"/>
-              <a:t>RESNET50_SEGNET</a:t>
-            </a:r>
-          </a:p>
-          <a:p>
-            <a:endParaRPr lang="en-US" dirty="0"/>
-          </a:p>
-          <a:p>
-            <a:endParaRPr lang="en-US" dirty="0"/>
-          </a:p>
-          <a:p>
-            <a:endParaRPr lang="en-US" dirty="0"/>
-          </a:p>
-        </p:txBody>
-      </p:sp>
-    </p:spTree>
-    <p:extLst>
-      <p:ext uri="{BB962C8B-B14F-4D97-AF65-F5344CB8AC3E}">
-        <p14:creationId xmlns:p14="http://schemas.microsoft.com/office/powerpoint/2010/main" val="2284028691"/>
-      </p:ext>
-    </p:extLst>
-  </p:cSld>
-  <p:clrMapOvr>
-    <a:masterClrMapping/>
-  </p:clrMapOvr>
-</p:sld>
-</file>
-
-<file path=ppt/slides/slide2.xml><?xml version="1.0" encoding="utf-8"?>
-<p:sld xmlns:a="http://schemas.openxmlformats.org/drawingml/2006/main" xmlns:r="http://schemas.openxmlformats.org/officeDocument/2006/relationships" xmlns:p="http://schemas.openxmlformats.org/presentationml/2006/main">
-  <p:cSld>
-    <p:spTree>
-      <p:nvGrpSpPr>
-        <p:cNvPr id="1" name=""/>
-        <p:cNvGrpSpPr/>
-        <p:nvPr/>
-      </p:nvGrpSpPr>
-      <p:grpSpPr>
-        <a:xfrm>
-          <a:off x="0" y="0"/>
-          <a:ext cx="0" cy="0"/>
-          <a:chOff x="0" y="0"/>
-          <a:chExt cx="0" cy="0"/>
-        </a:xfrm>
-      </p:grpSpPr>
-      <p:sp>
-        <p:nvSpPr>
-          <p:cNvPr id="2" name="Title 1">
-            <a:extLst>
-              <a:ext uri="{FF2B5EF4-FFF2-40B4-BE49-F238E27FC236}">
-                <a16:creationId xmlns:a16="http://schemas.microsoft.com/office/drawing/2014/main" id="{290560E4-1DCE-4331-8A7E-B115998A4AEE}"/>
-              </a:ext>
-            </a:extLst>
-          </p:cNvPr>
-          <p:cNvSpPr>
-            <a:spLocks noGrp="1"/>
-          </p:cNvSpPr>
-          <p:nvPr>
-            <p:ph type="title"/>
-          </p:nvPr>
-        </p:nvSpPr>
-        <p:spPr/>
-        <p:txBody>
-          <a:bodyPr/>
-          <a:lstStyle/>
-          <a:p>
-            <a:r>
-              <a:rPr lang="en-US" dirty="0"/>
-              <a:t>VGG_UNET</a:t>
-            </a:r>
-          </a:p>
-        </p:txBody>
-      </p:sp>
-      <p:sp>
-        <p:nvSpPr>
-          <p:cNvPr id="3" name="Content Placeholder 2">
-            <a:extLst>
-              <a:ext uri="{FF2B5EF4-FFF2-40B4-BE49-F238E27FC236}">
-                <a16:creationId xmlns:a16="http://schemas.microsoft.com/office/drawing/2014/main" id="{521DC3D0-62A4-4CF2-9826-A58B04F745C1}"/>
-              </a:ext>
-            </a:extLst>
-          </p:cNvPr>
-          <p:cNvSpPr>
-            <a:spLocks noGrp="1"/>
-          </p:cNvSpPr>
-          <p:nvPr>
-            <p:ph idx="1"/>
-          </p:nvPr>
-        </p:nvSpPr>
-        <p:spPr/>
-        <p:txBody>
-          <a:bodyPr/>
-          <a:lstStyle/>
-          <a:p>
-            <a:endParaRPr lang="en-US" dirty="0"/>
-          </a:p>
-        </p:txBody>
-      </p:sp>
+            <p:extLst>
+              <p:ext uri="{D42A27DB-BD31-4B8C-83A1-F6EECF244321}">
+                <p14:modId xmlns:p14="http://schemas.microsoft.com/office/powerpoint/2010/main" val="3678673256"/>
+              </p:ext>
+            </p:extLst>
+          </p:nvPr>
+        </p:nvGraphicFramePr>
+        <p:xfrm>
+          <a:off x="5428538" y="1724165"/>
+          <a:ext cx="4594588" cy="1568391"/>
+        </p:xfrm>
+        <a:graphic>
+          <a:graphicData uri="http://schemas.openxmlformats.org/drawingml/2006/table">
+            <a:tbl>
+              <a:tblPr>
+                <a:tableStyleId>{5C22544A-7EE6-4342-B048-85BDC9FD1C3A}</a:tableStyleId>
+              </a:tblPr>
+              <a:tblGrid>
+                <a:gridCol w="1312738">
+                  <a:extLst>
+                    <a:ext uri="{9D8B030D-6E8A-4147-A177-3AD203B41FA5}">
+                      <a16:colId xmlns:a16="http://schemas.microsoft.com/office/drawing/2014/main" val="1714467739"/>
+                    </a:ext>
+                  </a:extLst>
+                </a:gridCol>
+                <a:gridCol w="1093950">
+                  <a:extLst>
+                    <a:ext uri="{9D8B030D-6E8A-4147-A177-3AD203B41FA5}">
+                      <a16:colId xmlns:a16="http://schemas.microsoft.com/office/drawing/2014/main" val="1723539072"/>
+                    </a:ext>
+                  </a:extLst>
+                </a:gridCol>
+                <a:gridCol w="1093950">
+                  <a:extLst>
+                    <a:ext uri="{9D8B030D-6E8A-4147-A177-3AD203B41FA5}">
+                      <a16:colId xmlns:a16="http://schemas.microsoft.com/office/drawing/2014/main" val="3694172664"/>
+                    </a:ext>
+                  </a:extLst>
+                </a:gridCol>
+                <a:gridCol w="1093950">
+                  <a:extLst>
+                    <a:ext uri="{9D8B030D-6E8A-4147-A177-3AD203B41FA5}">
+                      <a16:colId xmlns:a16="http://schemas.microsoft.com/office/drawing/2014/main" val="3682667351"/>
+                    </a:ext>
+                  </a:extLst>
+                </a:gridCol>
+              </a:tblGrid>
+              <a:tr h="522797">
+                <a:tc>
+                  <a:txBody>
+                    <a:bodyPr/>
+                    <a:lstStyle/>
+                    <a:p>
+                      <a:pPr algn="l" fontAlgn="b"/>
+                      <a:r>
+                        <a:rPr lang="en-US" sz="2400" u="none" strike="noStrike" dirty="0">
+                          <a:effectLst/>
+                        </a:rPr>
+                        <a:t> </a:t>
+                      </a:r>
+                      <a:endParaRPr lang="en-US" sz="2400" b="0" i="0" u="none" strike="noStrike" dirty="0">
+                        <a:solidFill>
+                          <a:srgbClr val="000000"/>
+                        </a:solidFill>
+                        <a:effectLst/>
+                        <a:latin typeface="Calibri" panose="020F0502020204030204" pitchFamily="34" charset="0"/>
+                      </a:endParaRPr>
+                    </a:p>
+                  </a:txBody>
+                  <a:tcPr marL="9525" marR="9525" marT="9525" marB="0" anchor="b"/>
+                </a:tc>
+                <a:tc>
+                  <a:txBody>
+                    <a:bodyPr/>
+                    <a:lstStyle/>
+                    <a:p>
+                      <a:pPr algn="l" fontAlgn="b"/>
+                      <a:r>
+                        <a:rPr lang="en-US" sz="2400" u="none" strike="noStrike">
+                          <a:effectLst/>
+                        </a:rPr>
+                        <a:t>Train</a:t>
+                      </a:r>
+                      <a:endParaRPr lang="en-US" sz="2400" b="0" i="0" u="none" strike="noStrike">
+                        <a:solidFill>
+                          <a:srgbClr val="000000"/>
+                        </a:solidFill>
+                        <a:effectLst/>
+                        <a:latin typeface="Calibri" panose="020F0502020204030204" pitchFamily="34" charset="0"/>
+                      </a:endParaRPr>
+                    </a:p>
+                  </a:txBody>
+                  <a:tcPr marL="9525" marR="9525" marT="9525" marB="0" anchor="b"/>
+                </a:tc>
+                <a:tc>
+                  <a:txBody>
+                    <a:bodyPr/>
+                    <a:lstStyle/>
+                    <a:p>
+                      <a:pPr algn="l" fontAlgn="b"/>
+                      <a:r>
+                        <a:rPr lang="en-US" sz="2400" u="none" strike="noStrike">
+                          <a:effectLst/>
+                        </a:rPr>
+                        <a:t>Val</a:t>
+                      </a:r>
+                      <a:endParaRPr lang="en-US" sz="2400" b="0" i="0" u="none" strike="noStrike">
+                        <a:solidFill>
+                          <a:srgbClr val="000000"/>
+                        </a:solidFill>
+                        <a:effectLst/>
+                        <a:latin typeface="Calibri" panose="020F0502020204030204" pitchFamily="34" charset="0"/>
+                      </a:endParaRPr>
+                    </a:p>
+                  </a:txBody>
+                  <a:tcPr marL="9525" marR="9525" marT="9525" marB="0" anchor="b"/>
+                </a:tc>
+                <a:tc>
+                  <a:txBody>
+                    <a:bodyPr/>
+                    <a:lstStyle/>
+                    <a:p>
+                      <a:pPr algn="l" fontAlgn="b"/>
+                      <a:r>
+                        <a:rPr lang="en-US" sz="2400" u="none" strike="noStrike">
+                          <a:effectLst/>
+                        </a:rPr>
+                        <a:t>Test</a:t>
+                      </a:r>
+                      <a:endParaRPr lang="en-US" sz="2400" b="0" i="0" u="none" strike="noStrike">
+                        <a:solidFill>
+                          <a:srgbClr val="000000"/>
+                        </a:solidFill>
+                        <a:effectLst/>
+                        <a:latin typeface="Calibri" panose="020F0502020204030204" pitchFamily="34" charset="0"/>
+                      </a:endParaRPr>
+                    </a:p>
+                  </a:txBody>
+                  <a:tcPr marL="9525" marR="9525" marT="9525" marB="0" anchor="b"/>
+                </a:tc>
+                <a:extLst>
+                  <a:ext uri="{0D108BD9-81ED-4DB2-BD59-A6C34878D82A}">
+                    <a16:rowId xmlns:a16="http://schemas.microsoft.com/office/drawing/2014/main" val="2568762136"/>
+                  </a:ext>
+                </a:extLst>
+              </a:tr>
+              <a:tr h="522797">
+                <a:tc>
+                  <a:txBody>
+                    <a:bodyPr/>
+                    <a:lstStyle/>
+                    <a:p>
+                      <a:pPr algn="l" fontAlgn="b"/>
+                      <a:r>
+                        <a:rPr lang="en-US" sz="2400" u="none" strike="noStrike" dirty="0">
+                          <a:effectLst/>
+                        </a:rPr>
+                        <a:t>Images</a:t>
+                      </a:r>
+                      <a:endParaRPr lang="en-US" sz="2400" b="0" i="0" u="none" strike="noStrike" dirty="0">
+                        <a:solidFill>
+                          <a:srgbClr val="000000"/>
+                        </a:solidFill>
+                        <a:effectLst/>
+                        <a:latin typeface="Calibri" panose="020F0502020204030204" pitchFamily="34" charset="0"/>
+                      </a:endParaRPr>
+                    </a:p>
+                  </a:txBody>
+                  <a:tcPr marL="9525" marR="9525" marT="9525" marB="0" anchor="b"/>
+                </a:tc>
+                <a:tc>
+                  <a:txBody>
+                    <a:bodyPr/>
+                    <a:lstStyle/>
+                    <a:p>
+                      <a:pPr algn="r" fontAlgn="b"/>
+                      <a:r>
+                        <a:rPr lang="en-US" sz="2400" u="none" strike="noStrike" dirty="0">
+                          <a:effectLst/>
+                        </a:rPr>
+                        <a:t>8221</a:t>
+                      </a:r>
+                      <a:endParaRPr lang="en-US" sz="2400" b="0" i="0" u="none" strike="noStrike" dirty="0">
+                        <a:solidFill>
+                          <a:srgbClr val="000000"/>
+                        </a:solidFill>
+                        <a:effectLst/>
+                        <a:latin typeface="Calibri" panose="020F0502020204030204" pitchFamily="34" charset="0"/>
+                      </a:endParaRPr>
+                    </a:p>
+                  </a:txBody>
+                  <a:tcPr marL="9525" marR="9525" marT="9525" marB="0" anchor="b"/>
+                </a:tc>
+                <a:tc>
+                  <a:txBody>
+                    <a:bodyPr/>
+                    <a:lstStyle/>
+                    <a:p>
+                      <a:pPr algn="r" fontAlgn="b"/>
+                      <a:r>
+                        <a:rPr lang="en-US" sz="2400" u="none" strike="noStrike">
+                          <a:effectLst/>
+                        </a:rPr>
+                        <a:t>2056</a:t>
+                      </a:r>
+                      <a:endParaRPr lang="en-US" sz="2400" b="0" i="0" u="none" strike="noStrike">
+                        <a:solidFill>
+                          <a:srgbClr val="000000"/>
+                        </a:solidFill>
+                        <a:effectLst/>
+                        <a:latin typeface="Calibri" panose="020F0502020204030204" pitchFamily="34" charset="0"/>
+                      </a:endParaRPr>
+                    </a:p>
+                  </a:txBody>
+                  <a:tcPr marL="9525" marR="9525" marT="9525" marB="0" anchor="b"/>
+                </a:tc>
+                <a:tc>
+                  <a:txBody>
+                    <a:bodyPr/>
+                    <a:lstStyle/>
+                    <a:p>
+                      <a:pPr algn="r" fontAlgn="b"/>
+                      <a:r>
+                        <a:rPr lang="en-US" sz="2400" u="none" strike="noStrike" dirty="0">
+                          <a:effectLst/>
+                        </a:rPr>
+                        <a:t>2570</a:t>
+                      </a:r>
+                      <a:endParaRPr lang="en-US" sz="2400" b="0" i="0" u="none" strike="noStrike" dirty="0">
+                        <a:solidFill>
+                          <a:srgbClr val="000000"/>
+                        </a:solidFill>
+                        <a:effectLst/>
+                        <a:latin typeface="Calibri" panose="020F0502020204030204" pitchFamily="34" charset="0"/>
+                      </a:endParaRPr>
+                    </a:p>
+                  </a:txBody>
+                  <a:tcPr marL="9525" marR="9525" marT="9525" marB="0" anchor="b"/>
+                </a:tc>
+                <a:extLst>
+                  <a:ext uri="{0D108BD9-81ED-4DB2-BD59-A6C34878D82A}">
+                    <a16:rowId xmlns:a16="http://schemas.microsoft.com/office/drawing/2014/main" val="1840445195"/>
+                  </a:ext>
+                </a:extLst>
+              </a:tr>
+              <a:tr h="522797">
+                <a:tc>
+                  <a:txBody>
+                    <a:bodyPr/>
+                    <a:lstStyle/>
+                    <a:p>
+                      <a:pPr algn="l" fontAlgn="b"/>
+                      <a:r>
+                        <a:rPr lang="en-US" sz="2400" u="none" strike="noStrike">
+                          <a:effectLst/>
+                        </a:rPr>
+                        <a:t>Mask</a:t>
+                      </a:r>
+                      <a:endParaRPr lang="en-US" sz="2400" b="0" i="0" u="none" strike="noStrike">
+                        <a:solidFill>
+                          <a:srgbClr val="000000"/>
+                        </a:solidFill>
+                        <a:effectLst/>
+                        <a:latin typeface="Calibri" panose="020F0502020204030204" pitchFamily="34" charset="0"/>
+                      </a:endParaRPr>
+                    </a:p>
+                  </a:txBody>
+                  <a:tcPr marL="9525" marR="9525" marT="9525" marB="0" anchor="b"/>
+                </a:tc>
+                <a:tc>
+                  <a:txBody>
+                    <a:bodyPr/>
+                    <a:lstStyle/>
+                    <a:p>
+                      <a:pPr algn="r" fontAlgn="b"/>
+                      <a:r>
+                        <a:rPr lang="en-US" sz="2400" u="none" strike="noStrike">
+                          <a:effectLst/>
+                        </a:rPr>
+                        <a:t>8221</a:t>
+                      </a:r>
+                      <a:endParaRPr lang="en-US" sz="2400" b="0" i="0" u="none" strike="noStrike">
+                        <a:solidFill>
+                          <a:srgbClr val="000000"/>
+                        </a:solidFill>
+                        <a:effectLst/>
+                        <a:latin typeface="Calibri" panose="020F0502020204030204" pitchFamily="34" charset="0"/>
+                      </a:endParaRPr>
+                    </a:p>
+                  </a:txBody>
+                  <a:tcPr marL="9525" marR="9525" marT="9525" marB="0" anchor="b"/>
+                </a:tc>
+                <a:tc>
+                  <a:txBody>
+                    <a:bodyPr/>
+                    <a:lstStyle/>
+                    <a:p>
+                      <a:pPr algn="r" fontAlgn="b"/>
+                      <a:r>
+                        <a:rPr lang="en-US" sz="2400" u="none" strike="noStrike" dirty="0">
+                          <a:effectLst/>
+                        </a:rPr>
+                        <a:t>2056</a:t>
+                      </a:r>
+                      <a:endParaRPr lang="en-US" sz="2400" b="0" i="0" u="none" strike="noStrike" dirty="0">
+                        <a:solidFill>
+                          <a:srgbClr val="000000"/>
+                        </a:solidFill>
+                        <a:effectLst/>
+                        <a:latin typeface="Calibri" panose="020F0502020204030204" pitchFamily="34" charset="0"/>
+                      </a:endParaRPr>
+                    </a:p>
+                  </a:txBody>
+                  <a:tcPr marL="9525" marR="9525" marT="9525" marB="0" anchor="b"/>
+                </a:tc>
+                <a:tc>
+                  <a:txBody>
+                    <a:bodyPr/>
+                    <a:lstStyle/>
+                    <a:p>
+                      <a:pPr algn="r" fontAlgn="b"/>
+                      <a:r>
+                        <a:rPr lang="en-US" sz="2400" u="none" strike="noStrike" dirty="0">
+                          <a:effectLst/>
+                        </a:rPr>
+                        <a:t>2570</a:t>
+                      </a:r>
+                      <a:endParaRPr lang="en-US" sz="2400" b="0" i="0" u="none" strike="noStrike" dirty="0">
+                        <a:solidFill>
+                          <a:srgbClr val="000000"/>
+                        </a:solidFill>
+                        <a:effectLst/>
+                        <a:latin typeface="Calibri" panose="020F0502020204030204" pitchFamily="34" charset="0"/>
+                      </a:endParaRPr>
+                    </a:p>
+                  </a:txBody>
+                  <a:tcPr marL="9525" marR="9525" marT="9525" marB="0" anchor="b"/>
+                </a:tc>
+                <a:extLst>
+                  <a:ext uri="{0D108BD9-81ED-4DB2-BD59-A6C34878D82A}">
+                    <a16:rowId xmlns:a16="http://schemas.microsoft.com/office/drawing/2014/main" val="962284944"/>
+                  </a:ext>
+                </a:extLst>
+              </a:tr>
+            </a:tbl>
+          </a:graphicData>
+        </a:graphic>
+      </p:graphicFrame>
       <p:pic>
         <p:nvPicPr>
-          <p:cNvPr id="5" name="Picture 4">
-            <a:extLst>
-              <a:ext uri="{FF2B5EF4-FFF2-40B4-BE49-F238E27FC236}">
-                <a16:creationId xmlns:a16="http://schemas.microsoft.com/office/drawing/2014/main" id="{FE0287E6-9B70-4E0B-9787-9D3FC772B75E}"/>
+          <p:cNvPr id="8" name="Content Placeholder 4" descr="A picture containing text, monitor, screen, display&#10;&#10;Description automatically generated">
+            <a:extLst>
+              <a:ext uri="{FF2B5EF4-FFF2-40B4-BE49-F238E27FC236}">
+                <a16:creationId xmlns:a16="http://schemas.microsoft.com/office/drawing/2014/main" id="{839FF440-C9A7-4D39-912C-C3EFE7B8FD7B}"/>
               </a:ext>
             </a:extLst>
           </p:cNvPr>
@@ -3516,15 +3739,21 @@
           <p:nvPr/>
         </p:nvPicPr>
         <p:blipFill>
-          <a:blip r:embed="rId2"/>
+          <a:blip r:embed="rId2">
+            <a:extLst>
+              <a:ext uri="{28A0092B-C50C-407E-A947-70E740481C1C}">
+                <a14:useLocalDpi xmlns:a14="http://schemas.microsoft.com/office/drawing/2010/main" val="0"/>
+              </a:ext>
+            </a:extLst>
+          </a:blip>
           <a:stretch>
             <a:fillRect/>
           </a:stretch>
         </p:blipFill>
         <p:spPr>
           <a:xfrm>
-            <a:off x="6116388" y="0"/>
-            <a:ext cx="5821072" cy="3647872"/>
+            <a:off x="6307677" y="3326033"/>
+            <a:ext cx="3715449" cy="3715449"/>
           </a:xfrm>
           <a:prstGeom prst="rect">
             <a:avLst/>
@@ -3533,10 +3762,10 @@
       </p:pic>
       <p:pic>
         <p:nvPicPr>
-          <p:cNvPr id="7" name="Picture 6">
-            <a:extLst>
-              <a:ext uri="{FF2B5EF4-FFF2-40B4-BE49-F238E27FC236}">
-                <a16:creationId xmlns:a16="http://schemas.microsoft.com/office/drawing/2014/main" id="{C634CB07-383C-4FF5-8EF1-B1F8AC726240}"/>
+          <p:cNvPr id="9" name="Picture 8" descr="Chart, histogram&#10;&#10;Description automatically generated">
+            <a:extLst>
+              <a:ext uri="{FF2B5EF4-FFF2-40B4-BE49-F238E27FC236}">
+                <a16:creationId xmlns:a16="http://schemas.microsoft.com/office/drawing/2014/main" id="{80FAC45C-AF1D-43C9-81AD-32D752B3C85B}"/>
               </a:ext>
             </a:extLst>
           </p:cNvPr>
@@ -3546,27 +3775,68 @@
           <p:nvPr/>
         </p:nvPicPr>
         <p:blipFill>
-          <a:blip r:embed="rId3"/>
+          <a:blip r:embed="rId3">
+            <a:extLst>
+              <a:ext uri="{28A0092B-C50C-407E-A947-70E740481C1C}">
+                <a14:useLocalDpi xmlns:a14="http://schemas.microsoft.com/office/drawing/2010/main" val="0"/>
+              </a:ext>
+            </a:extLst>
+          </a:blip>
           <a:stretch>
             <a:fillRect/>
           </a:stretch>
         </p:blipFill>
         <p:spPr>
           <a:xfrm>
-            <a:off x="581782" y="1345074"/>
-            <a:ext cx="4021940" cy="2083926"/>
+            <a:off x="1152382" y="3565444"/>
+            <a:ext cx="4684647" cy="3123098"/>
           </a:xfrm>
           <a:prstGeom prst="rect">
             <a:avLst/>
           </a:prstGeom>
         </p:spPr>
       </p:pic>
+      <p:sp>
+        <p:nvSpPr>
+          <p:cNvPr id="10" name="TextBox 9">
+            <a:extLst>
+              <a:ext uri="{FF2B5EF4-FFF2-40B4-BE49-F238E27FC236}">
+                <a16:creationId xmlns:a16="http://schemas.microsoft.com/office/drawing/2014/main" id="{04698C43-D5C2-4CFE-A507-082E4A7800B2}"/>
+              </a:ext>
+            </a:extLst>
+          </p:cNvPr>
+          <p:cNvSpPr txBox="1"/>
+          <p:nvPr/>
+        </p:nvSpPr>
+        <p:spPr>
+          <a:xfrm>
+            <a:off x="7493785" y="3669957"/>
+            <a:ext cx="1114408" cy="369332"/>
+          </a:xfrm>
+          <a:prstGeom prst="rect">
+            <a:avLst/>
+          </a:prstGeom>
+          <a:noFill/>
+        </p:spPr>
+        <p:txBody>
+          <a:bodyPr wrap="none" rtlCol="0">
+            <a:spAutoFit/>
+          </a:bodyPr>
+          <a:lstStyle/>
+          <a:p>
+            <a:r>
+              <a:rPr lang="en-US" dirty="0"/>
+              <a:t>Mask PCA</a:t>
+            </a:r>
+          </a:p>
+        </p:txBody>
+      </p:sp>
       <p:pic>
         <p:nvPicPr>
-          <p:cNvPr id="8" name="Picture 7">
-            <a:extLst>
-              <a:ext uri="{FF2B5EF4-FFF2-40B4-BE49-F238E27FC236}">
-                <a16:creationId xmlns:a16="http://schemas.microsoft.com/office/drawing/2014/main" id="{F6DBFDE4-D1FA-46E6-B776-E1A94F4E12EC}"/>
+          <p:cNvPr id="5" name="Picture 4">
+            <a:extLst>
+              <a:ext uri="{FF2B5EF4-FFF2-40B4-BE49-F238E27FC236}">
+                <a16:creationId xmlns:a16="http://schemas.microsoft.com/office/drawing/2014/main" id="{A1EA17B9-49A2-4E5A-939B-3580F0BEF19A}"/>
               </a:ext>
             </a:extLst>
           </p:cNvPr>
@@ -3583,38 +3853,8 @@
         </p:blipFill>
         <p:spPr>
           <a:xfrm>
-            <a:off x="648844" y="3657051"/>
-            <a:ext cx="9364757" cy="3212290"/>
-          </a:xfrm>
-          <a:prstGeom prst="rect">
-            <a:avLst/>
-          </a:prstGeom>
-        </p:spPr>
-      </p:pic>
-      <p:pic>
-        <p:nvPicPr>
-          <p:cNvPr id="10" name="Picture 9">
-            <a:extLst>
-              <a:ext uri="{FF2B5EF4-FFF2-40B4-BE49-F238E27FC236}">
-                <a16:creationId xmlns:a16="http://schemas.microsoft.com/office/drawing/2014/main" id="{B0B618B4-B3CD-4068-A44A-168A046B1DCC}"/>
-              </a:ext>
-            </a:extLst>
-          </p:cNvPr>
-          <p:cNvPicPr>
-            <a:picLocks noChangeAspect="1"/>
-          </p:cNvPicPr>
-          <p:nvPr/>
-        </p:nvPicPr>
-        <p:blipFill>
-          <a:blip r:embed="rId5"/>
-          <a:stretch>
-            <a:fillRect/>
-          </a:stretch>
-        </p:blipFill>
-        <p:spPr>
-          <a:xfrm>
-            <a:off x="63449" y="3311437"/>
-            <a:ext cx="5267774" cy="672869"/>
+            <a:off x="1026539" y="1682982"/>
+            <a:ext cx="3654086" cy="1695412"/>
           </a:xfrm>
           <a:prstGeom prst="rect">
             <a:avLst/>
@@ -3624,7 +3864,7 @@
     </p:spTree>
     <p:extLst>
       <p:ext uri="{BB962C8B-B14F-4D97-AF65-F5344CB8AC3E}">
-        <p14:creationId xmlns:p14="http://schemas.microsoft.com/office/powerpoint/2010/main" val="598869573"/>
+        <p14:creationId xmlns:p14="http://schemas.microsoft.com/office/powerpoint/2010/main" val="566852420"/>
       </p:ext>
     </p:extLst>
   </p:cSld>
@@ -3634,7 +3874,7 @@
 </p:sld>
 </file>
 
-<file path=ppt/slides/slide3.xml><?xml version="1.0" encoding="utf-8"?>
+<file path=ppt/slides/slide2.xml><?xml version="1.0" encoding="utf-8"?>
 <p:sld xmlns:a="http://schemas.openxmlformats.org/drawingml/2006/main" xmlns:r="http://schemas.openxmlformats.org/officeDocument/2006/relationships" xmlns:p="http://schemas.openxmlformats.org/presentationml/2006/main">
   <p:cSld>
     <p:spTree>
@@ -3857,6 +4097,492 @@
     <p:extLst>
       <p:ext uri="{BB962C8B-B14F-4D97-AF65-F5344CB8AC3E}">
         <p14:creationId xmlns:p14="http://schemas.microsoft.com/office/powerpoint/2010/main" val="2631241968"/>
+      </p:ext>
+    </p:extLst>
+  </p:cSld>
+  <p:clrMapOvr>
+    <a:masterClrMapping/>
+  </p:clrMapOvr>
+</p:sld>
+</file>
+
+<file path=ppt/slides/slide3.xml><?xml version="1.0" encoding="utf-8"?>
+<p:sld xmlns:a="http://schemas.openxmlformats.org/drawingml/2006/main" xmlns:r="http://schemas.openxmlformats.org/officeDocument/2006/relationships" xmlns:p="http://schemas.openxmlformats.org/presentationml/2006/main">
+  <p:cSld>
+    <p:spTree>
+      <p:nvGrpSpPr>
+        <p:cNvPr id="1" name=""/>
+        <p:cNvGrpSpPr/>
+        <p:nvPr/>
+      </p:nvGrpSpPr>
+      <p:grpSpPr>
+        <a:xfrm>
+          <a:off x="0" y="0"/>
+          <a:ext cx="0" cy="0"/>
+          <a:chOff x="0" y="0"/>
+          <a:chExt cx="0" cy="0"/>
+        </a:xfrm>
+      </p:grpSpPr>
+      <p:sp>
+        <p:nvSpPr>
+          <p:cNvPr id="2" name="Title 1">
+            <a:extLst>
+              <a:ext uri="{FF2B5EF4-FFF2-40B4-BE49-F238E27FC236}">
+                <a16:creationId xmlns:a16="http://schemas.microsoft.com/office/drawing/2014/main" id="{8D24E6E1-A6C0-4B0E-996A-97613C04D641}"/>
+              </a:ext>
+            </a:extLst>
+          </p:cNvPr>
+          <p:cNvSpPr>
+            <a:spLocks noGrp="1"/>
+          </p:cNvSpPr>
+          <p:nvPr>
+            <p:ph type="title"/>
+          </p:nvPr>
+        </p:nvSpPr>
+        <p:spPr/>
+        <p:txBody>
+          <a:bodyPr/>
+          <a:lstStyle/>
+          <a:p>
+            <a:r>
+              <a:rPr lang="en-US" dirty="0"/>
+              <a:t>Models</a:t>
+            </a:r>
+          </a:p>
+        </p:txBody>
+      </p:sp>
+      <p:sp>
+        <p:nvSpPr>
+          <p:cNvPr id="3" name="Content Placeholder 2">
+            <a:extLst>
+              <a:ext uri="{FF2B5EF4-FFF2-40B4-BE49-F238E27FC236}">
+                <a16:creationId xmlns:a16="http://schemas.microsoft.com/office/drawing/2014/main" id="{E291BEC6-7826-4CF8-A2AE-7CA47A821A2A}"/>
+              </a:ext>
+            </a:extLst>
+          </p:cNvPr>
+          <p:cNvSpPr>
+            <a:spLocks noGrp="1"/>
+          </p:cNvSpPr>
+          <p:nvPr>
+            <p:ph idx="1"/>
+          </p:nvPr>
+        </p:nvSpPr>
+        <p:spPr/>
+        <p:txBody>
+          <a:bodyPr/>
+          <a:lstStyle/>
+          <a:p>
+            <a:r>
+              <a:rPr lang="en-US" dirty="0"/>
+              <a:t>VGG16_UNET</a:t>
+            </a:r>
+          </a:p>
+          <a:p>
+            <a:r>
+              <a:rPr lang="en-US" dirty="0"/>
+              <a:t>RESNET50_UNET (In progress)</a:t>
+            </a:r>
+          </a:p>
+          <a:p>
+            <a:r>
+              <a:rPr lang="en-US" dirty="0"/>
+              <a:t>VGG16_SEGNET (In progress)</a:t>
+            </a:r>
+          </a:p>
+          <a:p>
+            <a:r>
+              <a:rPr lang="en-US" dirty="0"/>
+              <a:t>RESNET50_SEGNET (In progress)</a:t>
+            </a:r>
+          </a:p>
+          <a:p>
+            <a:r>
+              <a:rPr lang="en-US" dirty="0"/>
+              <a:t>VGG16_PSPNET (In progress)</a:t>
+            </a:r>
+          </a:p>
+          <a:p>
+            <a:r>
+              <a:rPr lang="en-US" dirty="0"/>
+              <a:t>RESNET50_PSPNET (In progress)</a:t>
+            </a:r>
+          </a:p>
+          <a:p>
+            <a:pPr marL="0" indent="0">
+              <a:buNone/>
+            </a:pPr>
+            <a:endParaRPr lang="en-US" dirty="0"/>
+          </a:p>
+          <a:p>
+            <a:endParaRPr lang="en-US" dirty="0"/>
+          </a:p>
+          <a:p>
+            <a:endParaRPr lang="en-US" dirty="0"/>
+          </a:p>
+          <a:p>
+            <a:endParaRPr lang="en-US" dirty="0"/>
+          </a:p>
+        </p:txBody>
+      </p:sp>
+    </p:spTree>
+    <p:extLst>
+      <p:ext uri="{BB962C8B-B14F-4D97-AF65-F5344CB8AC3E}">
+        <p14:creationId xmlns:p14="http://schemas.microsoft.com/office/powerpoint/2010/main" val="2284028691"/>
+      </p:ext>
+    </p:extLst>
+  </p:cSld>
+  <p:clrMapOvr>
+    <a:masterClrMapping/>
+  </p:clrMapOvr>
+</p:sld>
+</file>
+
+<file path=ppt/slides/slide4.xml><?xml version="1.0" encoding="utf-8"?>
+<p:sld xmlns:a="http://schemas.openxmlformats.org/drawingml/2006/main" xmlns:r="http://schemas.openxmlformats.org/officeDocument/2006/relationships" xmlns:p="http://schemas.openxmlformats.org/presentationml/2006/main">
+  <p:cSld>
+    <p:spTree>
+      <p:nvGrpSpPr>
+        <p:cNvPr id="1" name=""/>
+        <p:cNvGrpSpPr/>
+        <p:nvPr/>
+      </p:nvGrpSpPr>
+      <p:grpSpPr>
+        <a:xfrm>
+          <a:off x="0" y="0"/>
+          <a:ext cx="0" cy="0"/>
+          <a:chOff x="0" y="0"/>
+          <a:chExt cx="0" cy="0"/>
+        </a:xfrm>
+      </p:grpSpPr>
+      <p:sp>
+        <p:nvSpPr>
+          <p:cNvPr id="2" name="Title 1">
+            <a:extLst>
+              <a:ext uri="{FF2B5EF4-FFF2-40B4-BE49-F238E27FC236}">
+                <a16:creationId xmlns:a16="http://schemas.microsoft.com/office/drawing/2014/main" id="{290560E4-1DCE-4331-8A7E-B115998A4AEE}"/>
+              </a:ext>
+            </a:extLst>
+          </p:cNvPr>
+          <p:cNvSpPr>
+            <a:spLocks noGrp="1"/>
+          </p:cNvSpPr>
+          <p:nvPr>
+            <p:ph type="title"/>
+          </p:nvPr>
+        </p:nvSpPr>
+        <p:spPr/>
+        <p:txBody>
+          <a:bodyPr/>
+          <a:lstStyle/>
+          <a:p>
+            <a:r>
+              <a:rPr lang="en-US" dirty="0"/>
+              <a:t>VGG_UNET</a:t>
+            </a:r>
+          </a:p>
+        </p:txBody>
+      </p:sp>
+      <p:sp>
+        <p:nvSpPr>
+          <p:cNvPr id="3" name="Content Placeholder 2">
+            <a:extLst>
+              <a:ext uri="{FF2B5EF4-FFF2-40B4-BE49-F238E27FC236}">
+                <a16:creationId xmlns:a16="http://schemas.microsoft.com/office/drawing/2014/main" id="{521DC3D0-62A4-4CF2-9826-A58B04F745C1}"/>
+              </a:ext>
+            </a:extLst>
+          </p:cNvPr>
+          <p:cNvSpPr>
+            <a:spLocks noGrp="1"/>
+          </p:cNvSpPr>
+          <p:nvPr>
+            <p:ph idx="1"/>
+          </p:nvPr>
+        </p:nvSpPr>
+        <p:spPr/>
+        <p:txBody>
+          <a:bodyPr/>
+          <a:lstStyle/>
+          <a:p>
+            <a:endParaRPr lang="en-US" dirty="0"/>
+          </a:p>
+        </p:txBody>
+      </p:sp>
+      <p:pic>
+        <p:nvPicPr>
+          <p:cNvPr id="5" name="Picture 4">
+            <a:extLst>
+              <a:ext uri="{FF2B5EF4-FFF2-40B4-BE49-F238E27FC236}">
+                <a16:creationId xmlns:a16="http://schemas.microsoft.com/office/drawing/2014/main" id="{FE0287E6-9B70-4E0B-9787-9D3FC772B75E}"/>
+              </a:ext>
+            </a:extLst>
+          </p:cNvPr>
+          <p:cNvPicPr>
+            <a:picLocks noChangeAspect="1"/>
+          </p:cNvPicPr>
+          <p:nvPr/>
+        </p:nvPicPr>
+        <p:blipFill>
+          <a:blip r:embed="rId2"/>
+          <a:stretch>
+            <a:fillRect/>
+          </a:stretch>
+        </p:blipFill>
+        <p:spPr>
+          <a:xfrm>
+            <a:off x="6116388" y="0"/>
+            <a:ext cx="5821072" cy="3647872"/>
+          </a:xfrm>
+          <a:prstGeom prst="rect">
+            <a:avLst/>
+          </a:prstGeom>
+        </p:spPr>
+      </p:pic>
+      <p:pic>
+        <p:nvPicPr>
+          <p:cNvPr id="7" name="Picture 6">
+            <a:extLst>
+              <a:ext uri="{FF2B5EF4-FFF2-40B4-BE49-F238E27FC236}">
+                <a16:creationId xmlns:a16="http://schemas.microsoft.com/office/drawing/2014/main" id="{C634CB07-383C-4FF5-8EF1-B1F8AC726240}"/>
+              </a:ext>
+            </a:extLst>
+          </p:cNvPr>
+          <p:cNvPicPr>
+            <a:picLocks noChangeAspect="1"/>
+          </p:cNvPicPr>
+          <p:nvPr/>
+        </p:nvPicPr>
+        <p:blipFill>
+          <a:blip r:embed="rId3"/>
+          <a:stretch>
+            <a:fillRect/>
+          </a:stretch>
+        </p:blipFill>
+        <p:spPr>
+          <a:xfrm>
+            <a:off x="581782" y="1345074"/>
+            <a:ext cx="4021940" cy="2083926"/>
+          </a:xfrm>
+          <a:prstGeom prst="rect">
+            <a:avLst/>
+          </a:prstGeom>
+        </p:spPr>
+      </p:pic>
+      <p:pic>
+        <p:nvPicPr>
+          <p:cNvPr id="8" name="Picture 7">
+            <a:extLst>
+              <a:ext uri="{FF2B5EF4-FFF2-40B4-BE49-F238E27FC236}">
+                <a16:creationId xmlns:a16="http://schemas.microsoft.com/office/drawing/2014/main" id="{F6DBFDE4-D1FA-46E6-B776-E1A94F4E12EC}"/>
+              </a:ext>
+            </a:extLst>
+          </p:cNvPr>
+          <p:cNvPicPr>
+            <a:picLocks noChangeAspect="1"/>
+          </p:cNvPicPr>
+          <p:nvPr/>
+        </p:nvPicPr>
+        <p:blipFill>
+          <a:blip r:embed="rId4"/>
+          <a:stretch>
+            <a:fillRect/>
+          </a:stretch>
+        </p:blipFill>
+        <p:spPr>
+          <a:xfrm>
+            <a:off x="648844" y="3657051"/>
+            <a:ext cx="9364757" cy="3212290"/>
+          </a:xfrm>
+          <a:prstGeom prst="rect">
+            <a:avLst/>
+          </a:prstGeom>
+        </p:spPr>
+      </p:pic>
+      <p:pic>
+        <p:nvPicPr>
+          <p:cNvPr id="10" name="Picture 9">
+            <a:extLst>
+              <a:ext uri="{FF2B5EF4-FFF2-40B4-BE49-F238E27FC236}">
+                <a16:creationId xmlns:a16="http://schemas.microsoft.com/office/drawing/2014/main" id="{B0B618B4-B3CD-4068-A44A-168A046B1DCC}"/>
+              </a:ext>
+            </a:extLst>
+          </p:cNvPr>
+          <p:cNvPicPr>
+            <a:picLocks noChangeAspect="1"/>
+          </p:cNvPicPr>
+          <p:nvPr/>
+        </p:nvPicPr>
+        <p:blipFill>
+          <a:blip r:embed="rId5"/>
+          <a:stretch>
+            <a:fillRect/>
+          </a:stretch>
+        </p:blipFill>
+        <p:spPr>
+          <a:xfrm>
+            <a:off x="63449" y="3311437"/>
+            <a:ext cx="5267774" cy="672869"/>
+          </a:xfrm>
+          <a:prstGeom prst="rect">
+            <a:avLst/>
+          </a:prstGeom>
+        </p:spPr>
+      </p:pic>
+    </p:spTree>
+    <p:extLst>
+      <p:ext uri="{BB962C8B-B14F-4D97-AF65-F5344CB8AC3E}">
+        <p14:creationId xmlns:p14="http://schemas.microsoft.com/office/powerpoint/2010/main" val="598869573"/>
+      </p:ext>
+    </p:extLst>
+  </p:cSld>
+  <p:clrMapOvr>
+    <a:masterClrMapping/>
+  </p:clrMapOvr>
+</p:sld>
+</file>
+
+<file path=ppt/slides/slide5.xml><?xml version="1.0" encoding="utf-8"?>
+<p:sld xmlns:a="http://schemas.openxmlformats.org/drawingml/2006/main" xmlns:r="http://schemas.openxmlformats.org/officeDocument/2006/relationships" xmlns:p="http://schemas.openxmlformats.org/presentationml/2006/main">
+  <p:cSld>
+    <p:spTree>
+      <p:nvGrpSpPr>
+        <p:cNvPr id="1" name=""/>
+        <p:cNvGrpSpPr/>
+        <p:nvPr/>
+      </p:nvGrpSpPr>
+      <p:grpSpPr>
+        <a:xfrm>
+          <a:off x="0" y="0"/>
+          <a:ext cx="0" cy="0"/>
+          <a:chOff x="0" y="0"/>
+          <a:chExt cx="0" cy="0"/>
+        </a:xfrm>
+      </p:grpSpPr>
+      <p:pic>
+        <p:nvPicPr>
+          <p:cNvPr id="7" name="Content Placeholder 6">
+            <a:extLst>
+              <a:ext uri="{FF2B5EF4-FFF2-40B4-BE49-F238E27FC236}">
+                <a16:creationId xmlns:a16="http://schemas.microsoft.com/office/drawing/2014/main" id="{00ACE465-A385-4792-B96C-8A60D945236E}"/>
+              </a:ext>
+            </a:extLst>
+          </p:cNvPr>
+          <p:cNvPicPr>
+            <a:picLocks noChangeAspect="1"/>
+          </p:cNvPicPr>
+          <p:nvPr/>
+        </p:nvPicPr>
+        <p:blipFill>
+          <a:blip r:embed="rId2"/>
+          <a:stretch>
+            <a:fillRect/>
+          </a:stretch>
+        </p:blipFill>
+        <p:spPr>
+          <a:xfrm>
+            <a:off x="2528407" y="3582725"/>
+            <a:ext cx="9572269" cy="3250752"/>
+          </a:xfrm>
+          <a:prstGeom prst="rect">
+            <a:avLst/>
+          </a:prstGeom>
+        </p:spPr>
+      </p:pic>
+      <p:pic>
+        <p:nvPicPr>
+          <p:cNvPr id="6" name="Content Placeholder 5">
+            <a:extLst>
+              <a:ext uri="{FF2B5EF4-FFF2-40B4-BE49-F238E27FC236}">
+                <a16:creationId xmlns:a16="http://schemas.microsoft.com/office/drawing/2014/main" id="{8D3C16F8-9F64-4778-9110-6D20C37AFF0C}"/>
+              </a:ext>
+            </a:extLst>
+          </p:cNvPr>
+          <p:cNvPicPr>
+            <a:picLocks noGrp="1" noChangeAspect="1"/>
+          </p:cNvPicPr>
+          <p:nvPr>
+            <p:ph idx="1"/>
+          </p:nvPr>
+        </p:nvPicPr>
+        <p:blipFill>
+          <a:blip r:embed="rId3"/>
+          <a:stretch>
+            <a:fillRect/>
+          </a:stretch>
+        </p:blipFill>
+        <p:spPr>
+          <a:xfrm>
+            <a:off x="5063070" y="362224"/>
+            <a:ext cx="7037607" cy="2175112"/>
+          </a:xfrm>
+        </p:spPr>
+      </p:pic>
+      <p:pic>
+        <p:nvPicPr>
+          <p:cNvPr id="4" name="Picture 3">
+            <a:extLst>
+              <a:ext uri="{FF2B5EF4-FFF2-40B4-BE49-F238E27FC236}">
+                <a16:creationId xmlns:a16="http://schemas.microsoft.com/office/drawing/2014/main" id="{6F5601C3-6135-464B-81CB-C2099D1A3A98}"/>
+              </a:ext>
+            </a:extLst>
+          </p:cNvPr>
+          <p:cNvPicPr>
+            <a:picLocks noChangeAspect="1"/>
+          </p:cNvPicPr>
+          <p:nvPr/>
+        </p:nvPicPr>
+        <p:blipFill>
+          <a:blip r:embed="rId4"/>
+          <a:stretch>
+            <a:fillRect/>
+          </a:stretch>
+        </p:blipFill>
+        <p:spPr>
+          <a:xfrm>
+            <a:off x="405302" y="1447689"/>
+            <a:ext cx="4734726" cy="2378036"/>
+          </a:xfrm>
+          <a:prstGeom prst="rect">
+            <a:avLst/>
+          </a:prstGeom>
+        </p:spPr>
+      </p:pic>
+      <p:sp>
+        <p:nvSpPr>
+          <p:cNvPr id="8" name="Title 1">
+            <a:extLst>
+              <a:ext uri="{FF2B5EF4-FFF2-40B4-BE49-F238E27FC236}">
+                <a16:creationId xmlns:a16="http://schemas.microsoft.com/office/drawing/2014/main" id="{D75774B8-87A7-4DC2-99B1-D9EAEDCAD08C}"/>
+              </a:ext>
+            </a:extLst>
+          </p:cNvPr>
+          <p:cNvSpPr>
+            <a:spLocks noGrp="1"/>
+          </p:cNvSpPr>
+          <p:nvPr>
+            <p:ph type="title"/>
+          </p:nvPr>
+        </p:nvSpPr>
+        <p:spPr>
+          <a:xfrm>
+            <a:off x="838200" y="365125"/>
+            <a:ext cx="10515600" cy="1325563"/>
+          </a:xfrm>
+        </p:spPr>
+        <p:txBody>
+          <a:bodyPr/>
+          <a:lstStyle/>
+          <a:p>
+            <a:r>
+              <a:rPr lang="en-US" dirty="0"/>
+              <a:t>VGG_UNET</a:t>
+            </a:r>
+          </a:p>
+        </p:txBody>
+      </p:sp>
+    </p:spTree>
+    <p:extLst>
+      <p:ext uri="{BB962C8B-B14F-4D97-AF65-F5344CB8AC3E}">
+        <p14:creationId xmlns:p14="http://schemas.microsoft.com/office/powerpoint/2010/main" val="2378935673"/>
       </p:ext>
     </p:extLst>
   </p:cSld>

</xml_diff>